<commit_message>
New application #4 has been added. First app in Web IDE
</commit_message>
<xml_diff>
--- a/Presentations/UI5_002.pptx
+++ b/Presentations/UI5_002.pptx
@@ -250,7 +250,7 @@
       <p15:sldGuideLst xmlns:p15="http://schemas.microsoft.com/office/powerpoint/2012/main"/>
     </p:ext>
     <p:ext uri="http://customooxmlschemas.google.com/">
-      <go:slidesCustomData xmlns="" xmlns:mc="http://schemas.openxmlformats.org/markup-compatibility/2006" xmlns:mv="urn:schemas-microsoft-com:mac:vml" xmlns:c="http://schemas.openxmlformats.org/drawingml/2006/chart" xmlns:dgm="http://schemas.openxmlformats.org/drawingml/2006/diagram" xmlns:o="urn:schemas-microsoft-com:office:office" xmlns:v="urn:schemas-microsoft-com:vml" xmlns:pvml="urn:schemas-microsoft-com:office:powerpoint" xmlns:com="http://schemas.openxmlformats.org/drawingml/2006/compatibility" xmlns:p14="http://schemas.microsoft.com/office/powerpoint/2010/main" xmlns:p15="http://schemas.microsoft.com/office/powerpoint/2012/main" xmlns:go="http://customooxmlschemas.google.com/" r:id="rId16" roundtripDataSignature="AMtx7mhcB0blr/SQn/d9pBN/m19CWvRtWQ=="/>
+      <go:slidesCustomData xmlns:go="http://customooxmlschemas.google.com/" xmlns:p15="http://schemas.microsoft.com/office/powerpoint/2012/main" xmlns:p14="http://schemas.microsoft.com/office/powerpoint/2010/main" xmlns:com="http://schemas.openxmlformats.org/drawingml/2006/compatibility" xmlns:pvml="urn:schemas-microsoft-com:office:powerpoint" xmlns:v="urn:schemas-microsoft-com:vml" xmlns:o="urn:schemas-microsoft-com:office:office" xmlns:dgm="http://schemas.openxmlformats.org/drawingml/2006/diagram" xmlns:c="http://schemas.openxmlformats.org/drawingml/2006/chart" xmlns:mv="urn:schemas-microsoft-com:mac:vml" xmlns:mc="http://schemas.openxmlformats.org/markup-compatibility/2006" xmlns="" r:id="rId16" roundtripDataSignature="AMtx7mhcB0blr/SQn/d9pBN/m19CWvRtWQ=="/>
     </p:ext>
   </p:extLst>
 </p:presentation>
@@ -1017,6 +1017,72 @@
     <p:extLst>
       <p:ext uri="{BB962C8B-B14F-4D97-AF65-F5344CB8AC3E}">
         <p14:creationId xmlns:p14="http://schemas.microsoft.com/office/powerpoint/2010/main" val="2751753162"/>
+      </p:ext>
+    </p:extLst>
+  </p:cSld>
+  <p:clrMapOvr>
+    <a:masterClrMapping/>
+  </p:clrMapOvr>
+</p:notes>
+</file>
+
+<file path=ppt/notesSlides/notesSlide4.xml><?xml version="1.0" encoding="utf-8"?>
+<p:notes xmlns:a="http://schemas.openxmlformats.org/drawingml/2006/main" xmlns:r="http://schemas.openxmlformats.org/officeDocument/2006/relationships" xmlns:p="http://schemas.openxmlformats.org/presentationml/2006/main">
+  <p:cSld>
+    <p:spTree>
+      <p:nvGrpSpPr>
+        <p:cNvPr id="1" name=""/>
+        <p:cNvGrpSpPr/>
+        <p:nvPr/>
+      </p:nvGrpSpPr>
+      <p:grpSpPr>
+        <a:xfrm>
+          <a:off x="0" y="0"/>
+          <a:ext cx="0" cy="0"/>
+          <a:chOff x="0" y="0"/>
+          <a:chExt cx="0" cy="0"/>
+        </a:xfrm>
+      </p:grpSpPr>
+      <p:sp>
+        <p:nvSpPr>
+          <p:cNvPr id="2" name="Slide Image Placeholder 1"/>
+          <p:cNvSpPr>
+            <a:spLocks noGrp="1" noRot="1" noChangeAspect="1"/>
+          </p:cNvSpPr>
+          <p:nvPr>
+            <p:ph type="sldImg"/>
+          </p:nvPr>
+        </p:nvSpPr>
+        <p:spPr>
+          <a:xfrm>
+            <a:off x="381000" y="685800"/>
+            <a:ext cx="6096000" cy="3429000"/>
+          </a:xfrm>
+        </p:spPr>
+      </p:sp>
+      <p:sp>
+        <p:nvSpPr>
+          <p:cNvPr id="3" name="Notes Placeholder 2"/>
+          <p:cNvSpPr>
+            <a:spLocks noGrp="1"/>
+          </p:cNvSpPr>
+          <p:nvPr>
+            <p:ph type="body" idx="1"/>
+          </p:nvPr>
+        </p:nvSpPr>
+        <p:spPr/>
+        <p:txBody>
+          <a:bodyPr/>
+          <a:lstStyle/>
+          <a:p>
+            <a:endParaRPr lang="en-US" dirty="0"/>
+          </a:p>
+        </p:txBody>
+      </p:sp>
+    </p:spTree>
+    <p:extLst>
+      <p:ext uri="{BB962C8B-B14F-4D97-AF65-F5344CB8AC3E}">
+        <p14:creationId xmlns:p14="http://schemas.microsoft.com/office/powerpoint/2010/main" val="373171878"/>
       </p:ext>
     </p:extLst>
   </p:cSld>
@@ -8992,6 +9058,427 @@
           </a:p>
         </p:txBody>
       </p:sp>
+      <p:sp>
+        <p:nvSpPr>
+          <p:cNvPr id="3" name="Google Shape;115;p3">
+            <a:extLst>
+              <a:ext uri="{FF2B5EF4-FFF2-40B4-BE49-F238E27FC236}">
+                <a16:creationId xmlns:a16="http://schemas.microsoft.com/office/drawing/2014/main" id="{545771F1-9534-4B84-B454-62E30D493A6B}"/>
+              </a:ext>
+            </a:extLst>
+          </p:cNvPr>
+          <p:cNvSpPr txBox="1">
+            <a:spLocks/>
+          </p:cNvSpPr>
+          <p:nvPr/>
+        </p:nvSpPr>
+        <p:spPr>
+          <a:xfrm>
+            <a:off x="152395" y="1825625"/>
+            <a:ext cx="3223851" cy="4351338"/>
+          </a:xfrm>
+          <a:prstGeom prst="rect">
+            <a:avLst/>
+          </a:prstGeom>
+          <a:noFill/>
+          <a:ln>
+            <a:noFill/>
+          </a:ln>
+        </p:spPr>
+        <p:txBody>
+          <a:bodyPr spcFirstLastPara="1" wrap="square" lIns="91425" tIns="45700" rIns="91425" bIns="45700" anchor="t" anchorCtr="0">
+            <a:normAutofit/>
+          </a:bodyPr>
+          <a:lstStyle>
+            <a:defPPr marR="0" lvl="0" algn="l" rtl="0">
+              <a:lnSpc>
+                <a:spcPct val="100000"/>
+              </a:lnSpc>
+              <a:spcBef>
+                <a:spcPts val="0"/>
+              </a:spcBef>
+              <a:spcAft>
+                <a:spcPts val="0"/>
+              </a:spcAft>
+            </a:defPPr>
+            <a:lvl1pPr marR="0" lvl="0" algn="l" rtl="0">
+              <a:lnSpc>
+                <a:spcPct val="100000"/>
+              </a:lnSpc>
+              <a:spcBef>
+                <a:spcPts val="0"/>
+              </a:spcBef>
+              <a:spcAft>
+                <a:spcPts val="0"/>
+              </a:spcAft>
+              <a:buClr>
+                <a:srgbClr val="000000"/>
+              </a:buClr>
+              <a:buFont typeface="Arial"/>
+              <a:defRPr sz="1400" b="0" i="0" u="none" strike="noStrike" cap="none">
+                <a:solidFill>
+                  <a:srgbClr val="000000"/>
+                </a:solidFill>
+                <a:latin typeface="Arial"/>
+                <a:ea typeface="Arial"/>
+                <a:cs typeface="Arial"/>
+                <a:sym typeface="Arial"/>
+              </a:defRPr>
+            </a:lvl1pPr>
+            <a:lvl2pPr marR="0" lvl="1" algn="l" rtl="0">
+              <a:lnSpc>
+                <a:spcPct val="100000"/>
+              </a:lnSpc>
+              <a:spcBef>
+                <a:spcPts val="0"/>
+              </a:spcBef>
+              <a:spcAft>
+                <a:spcPts val="0"/>
+              </a:spcAft>
+              <a:buClr>
+                <a:srgbClr val="000000"/>
+              </a:buClr>
+              <a:buFont typeface="Arial"/>
+              <a:defRPr sz="1400" b="0" i="0" u="none" strike="noStrike" cap="none">
+                <a:solidFill>
+                  <a:srgbClr val="000000"/>
+                </a:solidFill>
+                <a:latin typeface="Arial"/>
+                <a:ea typeface="Arial"/>
+                <a:cs typeface="Arial"/>
+                <a:sym typeface="Arial"/>
+              </a:defRPr>
+            </a:lvl2pPr>
+            <a:lvl3pPr marR="0" lvl="2" algn="l" rtl="0">
+              <a:lnSpc>
+                <a:spcPct val="100000"/>
+              </a:lnSpc>
+              <a:spcBef>
+                <a:spcPts val="0"/>
+              </a:spcBef>
+              <a:spcAft>
+                <a:spcPts val="0"/>
+              </a:spcAft>
+              <a:buClr>
+                <a:srgbClr val="000000"/>
+              </a:buClr>
+              <a:buFont typeface="Arial"/>
+              <a:defRPr sz="1400" b="0" i="0" u="none" strike="noStrike" cap="none">
+                <a:solidFill>
+                  <a:srgbClr val="000000"/>
+                </a:solidFill>
+                <a:latin typeface="Arial"/>
+                <a:ea typeface="Arial"/>
+                <a:cs typeface="Arial"/>
+                <a:sym typeface="Arial"/>
+              </a:defRPr>
+            </a:lvl3pPr>
+            <a:lvl4pPr marR="0" lvl="3" algn="l" rtl="0">
+              <a:lnSpc>
+                <a:spcPct val="100000"/>
+              </a:lnSpc>
+              <a:spcBef>
+                <a:spcPts val="0"/>
+              </a:spcBef>
+              <a:spcAft>
+                <a:spcPts val="0"/>
+              </a:spcAft>
+              <a:buClr>
+                <a:srgbClr val="000000"/>
+              </a:buClr>
+              <a:buFont typeface="Arial"/>
+              <a:defRPr sz="1400" b="0" i="0" u="none" strike="noStrike" cap="none">
+                <a:solidFill>
+                  <a:srgbClr val="000000"/>
+                </a:solidFill>
+                <a:latin typeface="Arial"/>
+                <a:ea typeface="Arial"/>
+                <a:cs typeface="Arial"/>
+                <a:sym typeface="Arial"/>
+              </a:defRPr>
+            </a:lvl4pPr>
+            <a:lvl5pPr marR="0" lvl="4" algn="l" rtl="0">
+              <a:lnSpc>
+                <a:spcPct val="100000"/>
+              </a:lnSpc>
+              <a:spcBef>
+                <a:spcPts val="0"/>
+              </a:spcBef>
+              <a:spcAft>
+                <a:spcPts val="0"/>
+              </a:spcAft>
+              <a:buClr>
+                <a:srgbClr val="000000"/>
+              </a:buClr>
+              <a:buFont typeface="Arial"/>
+              <a:defRPr sz="1400" b="0" i="0" u="none" strike="noStrike" cap="none">
+                <a:solidFill>
+                  <a:srgbClr val="000000"/>
+                </a:solidFill>
+                <a:latin typeface="Arial"/>
+                <a:ea typeface="Arial"/>
+                <a:cs typeface="Arial"/>
+                <a:sym typeface="Arial"/>
+              </a:defRPr>
+            </a:lvl5pPr>
+            <a:lvl6pPr marR="0" lvl="5" algn="l" rtl="0">
+              <a:lnSpc>
+                <a:spcPct val="100000"/>
+              </a:lnSpc>
+              <a:spcBef>
+                <a:spcPts val="0"/>
+              </a:spcBef>
+              <a:spcAft>
+                <a:spcPts val="0"/>
+              </a:spcAft>
+              <a:buClr>
+                <a:srgbClr val="000000"/>
+              </a:buClr>
+              <a:buFont typeface="Arial"/>
+              <a:defRPr sz="1400" b="0" i="0" u="none" strike="noStrike" cap="none">
+                <a:solidFill>
+                  <a:srgbClr val="000000"/>
+                </a:solidFill>
+                <a:latin typeface="Arial"/>
+                <a:ea typeface="Arial"/>
+                <a:cs typeface="Arial"/>
+                <a:sym typeface="Arial"/>
+              </a:defRPr>
+            </a:lvl6pPr>
+            <a:lvl7pPr marR="0" lvl="6" algn="l" rtl="0">
+              <a:lnSpc>
+                <a:spcPct val="100000"/>
+              </a:lnSpc>
+              <a:spcBef>
+                <a:spcPts val="0"/>
+              </a:spcBef>
+              <a:spcAft>
+                <a:spcPts val="0"/>
+              </a:spcAft>
+              <a:buClr>
+                <a:srgbClr val="000000"/>
+              </a:buClr>
+              <a:buFont typeface="Arial"/>
+              <a:defRPr sz="1400" b="0" i="0" u="none" strike="noStrike" cap="none">
+                <a:solidFill>
+                  <a:srgbClr val="000000"/>
+                </a:solidFill>
+                <a:latin typeface="Arial"/>
+                <a:ea typeface="Arial"/>
+                <a:cs typeface="Arial"/>
+                <a:sym typeface="Arial"/>
+              </a:defRPr>
+            </a:lvl7pPr>
+            <a:lvl8pPr marR="0" lvl="7" algn="l" rtl="0">
+              <a:lnSpc>
+                <a:spcPct val="100000"/>
+              </a:lnSpc>
+              <a:spcBef>
+                <a:spcPts val="0"/>
+              </a:spcBef>
+              <a:spcAft>
+                <a:spcPts val="0"/>
+              </a:spcAft>
+              <a:buClr>
+                <a:srgbClr val="000000"/>
+              </a:buClr>
+              <a:buFont typeface="Arial"/>
+              <a:defRPr sz="1400" b="0" i="0" u="none" strike="noStrike" cap="none">
+                <a:solidFill>
+                  <a:srgbClr val="000000"/>
+                </a:solidFill>
+                <a:latin typeface="Arial"/>
+                <a:ea typeface="Arial"/>
+                <a:cs typeface="Arial"/>
+                <a:sym typeface="Arial"/>
+              </a:defRPr>
+            </a:lvl8pPr>
+            <a:lvl9pPr marR="0" lvl="8" algn="l" rtl="0">
+              <a:lnSpc>
+                <a:spcPct val="100000"/>
+              </a:lnSpc>
+              <a:spcBef>
+                <a:spcPts val="0"/>
+              </a:spcBef>
+              <a:spcAft>
+                <a:spcPts val="0"/>
+              </a:spcAft>
+              <a:buClr>
+                <a:srgbClr val="000000"/>
+              </a:buClr>
+              <a:buFont typeface="Arial"/>
+              <a:defRPr sz="1400" b="0" i="0" u="none" strike="noStrike" cap="none">
+                <a:solidFill>
+                  <a:srgbClr val="000000"/>
+                </a:solidFill>
+                <a:latin typeface="Arial"/>
+                <a:ea typeface="Arial"/>
+                <a:cs typeface="Arial"/>
+                <a:sym typeface="Arial"/>
+              </a:defRPr>
+            </a:lvl9pPr>
+          </a:lstStyle>
+          <a:p>
+            <a:pPr marL="228600" lvl="0" indent="-228600">
+              <a:lnSpc>
+                <a:spcPct val="90000"/>
+              </a:lnSpc>
+              <a:spcBef>
+                <a:spcPts val="1000"/>
+              </a:spcBef>
+              <a:buClr>
+                <a:srgbClr val="2F5496"/>
+              </a:buClr>
+              <a:buSzPts val="2000"/>
+              <a:buFont typeface="Arial"/>
+              <a:buChar char="•"/>
+            </a:pPr>
+            <a:r>
+              <a:rPr lang="en-US" sz="2800" dirty="0">
+                <a:solidFill>
+                  <a:srgbClr val="2F5496"/>
+                </a:solidFill>
+                <a:latin typeface="Calibri"/>
+                <a:cs typeface="Calibri"/>
+                <a:sym typeface="Calibri"/>
+              </a:rPr>
+              <a:t>Take a tour first!</a:t>
+            </a:r>
+          </a:p>
+          <a:p>
+            <a:pPr marL="228600" lvl="0" indent="-228600">
+              <a:lnSpc>
+                <a:spcPct val="90000"/>
+              </a:lnSpc>
+              <a:spcBef>
+                <a:spcPts val="1000"/>
+              </a:spcBef>
+              <a:buClr>
+                <a:srgbClr val="2F5496"/>
+              </a:buClr>
+              <a:buSzPts val="2000"/>
+              <a:buFont typeface="Arial"/>
+              <a:buChar char="•"/>
+            </a:pPr>
+            <a:r>
+              <a:rPr lang="en-US" sz="2800" dirty="0">
+                <a:solidFill>
+                  <a:srgbClr val="2F5496"/>
+                </a:solidFill>
+                <a:latin typeface="Calibri"/>
+                <a:cs typeface="Calibri"/>
+                <a:sym typeface="Calibri"/>
+              </a:rPr>
+              <a:t>Check the previous applications then!</a:t>
+            </a:r>
+          </a:p>
+          <a:p>
+            <a:pPr marL="228600" lvl="0" indent="-228600">
+              <a:lnSpc>
+                <a:spcPct val="90000"/>
+              </a:lnSpc>
+              <a:spcBef>
+                <a:spcPts val="1000"/>
+              </a:spcBef>
+              <a:buClr>
+                <a:srgbClr val="2F5496"/>
+              </a:buClr>
+              <a:buSzPts val="2000"/>
+              <a:buFont typeface="Arial"/>
+              <a:buChar char="•"/>
+            </a:pPr>
+            <a:r>
+              <a:rPr lang="en-US" sz="2800" dirty="0">
+                <a:solidFill>
+                  <a:srgbClr val="2F5496"/>
+                </a:solidFill>
+                <a:latin typeface="Calibri"/>
+                <a:cs typeface="Calibri"/>
+                <a:sym typeface="Calibri"/>
+              </a:rPr>
+              <a:t>Why do we need `</a:t>
+            </a:r>
+            <a:r>
+              <a:rPr lang="en-US" sz="2800" dirty="0">
+                <a:solidFill>
+                  <a:srgbClr val="92D050"/>
+                </a:solidFill>
+                <a:latin typeface="Calibri"/>
+                <a:cs typeface="Calibri"/>
+                <a:sym typeface="Calibri"/>
+              </a:rPr>
+              <a:t>neo-</a:t>
+            </a:r>
+            <a:r>
+              <a:rPr lang="en-US" sz="2800" dirty="0" err="1">
+                <a:solidFill>
+                  <a:srgbClr val="92D050"/>
+                </a:solidFill>
+                <a:latin typeface="Calibri"/>
+                <a:cs typeface="Calibri"/>
+                <a:sym typeface="Calibri"/>
+              </a:rPr>
+              <a:t>app.json</a:t>
+            </a:r>
+            <a:r>
+              <a:rPr lang="en-US" sz="2800" dirty="0">
+                <a:solidFill>
+                  <a:srgbClr val="2F5496"/>
+                </a:solidFill>
+                <a:latin typeface="Calibri"/>
+                <a:cs typeface="Calibri"/>
+                <a:sym typeface="Calibri"/>
+              </a:rPr>
+              <a:t>` file?</a:t>
+            </a:r>
+          </a:p>
+          <a:p>
+            <a:pPr indent="127000">
+              <a:lnSpc>
+                <a:spcPct val="90000"/>
+              </a:lnSpc>
+              <a:spcBef>
+                <a:spcPts val="1000"/>
+              </a:spcBef>
+              <a:buClr>
+                <a:srgbClr val="2F5496"/>
+              </a:buClr>
+              <a:buSzPts val="2000"/>
+            </a:pPr>
+            <a:endParaRPr lang="en-US" sz="2000" dirty="0"/>
+          </a:p>
+        </p:txBody>
+      </p:sp>
+      <p:pic>
+        <p:nvPicPr>
+          <p:cNvPr id="4" name="Picture 3" descr="A screenshot of a cell phone&#10;&#10;Description automatically generated">
+            <a:extLst>
+              <a:ext uri="{FF2B5EF4-FFF2-40B4-BE49-F238E27FC236}">
+                <a16:creationId xmlns:a16="http://schemas.microsoft.com/office/drawing/2014/main" id="{DAE9D1F6-B811-4006-83B1-A4579E70ACB1}"/>
+              </a:ext>
+            </a:extLst>
+          </p:cNvPr>
+          <p:cNvPicPr>
+            <a:picLocks noChangeAspect="1"/>
+          </p:cNvPicPr>
+          <p:nvPr/>
+        </p:nvPicPr>
+        <p:blipFill>
+          <a:blip r:embed="rId2"/>
+          <a:stretch>
+            <a:fillRect/>
+          </a:stretch>
+        </p:blipFill>
+        <p:spPr>
+          <a:xfrm>
+            <a:off x="3481848" y="1825625"/>
+            <a:ext cx="6471044" cy="4518971"/>
+          </a:xfrm>
+          <a:prstGeom prst="rect">
+            <a:avLst/>
+          </a:prstGeom>
+        </p:spPr>
+      </p:pic>
     </p:spTree>
     <p:extLst>
       <p:ext uri="{BB962C8B-B14F-4D97-AF65-F5344CB8AC3E}">
@@ -9047,6 +9534,481 @@
               <a:rPr lang="en-US" dirty="0"/>
               <a:t>App#4: Start with a blank template!</a:t>
             </a:r>
+          </a:p>
+        </p:txBody>
+      </p:sp>
+      <p:pic>
+        <p:nvPicPr>
+          <p:cNvPr id="4" name="Picture 3" descr="A screenshot of a computer&#10;&#10;Description automatically generated">
+            <a:extLst>
+              <a:ext uri="{FF2B5EF4-FFF2-40B4-BE49-F238E27FC236}">
+                <a16:creationId xmlns:a16="http://schemas.microsoft.com/office/drawing/2014/main" id="{53F5BE5F-1D7B-430E-B4F6-D62C2EE29DAB}"/>
+              </a:ext>
+            </a:extLst>
+          </p:cNvPr>
+          <p:cNvPicPr>
+            <a:picLocks noChangeAspect="1"/>
+          </p:cNvPicPr>
+          <p:nvPr/>
+        </p:nvPicPr>
+        <p:blipFill>
+          <a:blip r:embed="rId3"/>
+          <a:stretch>
+            <a:fillRect/>
+          </a:stretch>
+        </p:blipFill>
+        <p:spPr>
+          <a:xfrm>
+            <a:off x="4988542" y="3377248"/>
+            <a:ext cx="4964350" cy="3476624"/>
+          </a:xfrm>
+          <a:prstGeom prst="rect">
+            <a:avLst/>
+          </a:prstGeom>
+        </p:spPr>
+      </p:pic>
+      <p:pic>
+        <p:nvPicPr>
+          <p:cNvPr id="6" name="Picture 5" descr="A screenshot of a cell phone&#10;&#10;Description automatically generated">
+            <a:extLst>
+              <a:ext uri="{FF2B5EF4-FFF2-40B4-BE49-F238E27FC236}">
+                <a16:creationId xmlns:a16="http://schemas.microsoft.com/office/drawing/2014/main" id="{EC0E935A-3557-4A6C-B60A-101610ACAC72}"/>
+              </a:ext>
+            </a:extLst>
+          </p:cNvPr>
+          <p:cNvPicPr>
+            <a:picLocks noChangeAspect="1"/>
+          </p:cNvPicPr>
+          <p:nvPr/>
+        </p:nvPicPr>
+        <p:blipFill>
+          <a:blip r:embed="rId4"/>
+          <a:stretch>
+            <a:fillRect/>
+          </a:stretch>
+        </p:blipFill>
+        <p:spPr>
+          <a:xfrm>
+            <a:off x="201248" y="1584960"/>
+            <a:ext cx="4787294" cy="5273040"/>
+          </a:xfrm>
+          <a:prstGeom prst="rect">
+            <a:avLst/>
+          </a:prstGeom>
+          <a:ln>
+            <a:solidFill>
+              <a:schemeClr val="tx1">
+                <a:lumMod val="50000"/>
+                <a:lumOff val="50000"/>
+              </a:schemeClr>
+            </a:solidFill>
+          </a:ln>
+        </p:spPr>
+      </p:pic>
+      <p:sp>
+        <p:nvSpPr>
+          <p:cNvPr id="8" name="Google Shape;115;p3">
+            <a:extLst>
+              <a:ext uri="{FF2B5EF4-FFF2-40B4-BE49-F238E27FC236}">
+                <a16:creationId xmlns:a16="http://schemas.microsoft.com/office/drawing/2014/main" id="{C0AB04CB-4518-4E43-A2EB-CD6B4230FD82}"/>
+              </a:ext>
+            </a:extLst>
+          </p:cNvPr>
+          <p:cNvSpPr txBox="1">
+            <a:spLocks/>
+          </p:cNvSpPr>
+          <p:nvPr/>
+        </p:nvSpPr>
+        <p:spPr>
+          <a:xfrm>
+            <a:off x="5088226" y="1584961"/>
+            <a:ext cx="4787294" cy="1788160"/>
+          </a:xfrm>
+          <a:prstGeom prst="rect">
+            <a:avLst/>
+          </a:prstGeom>
+          <a:noFill/>
+          <a:ln>
+            <a:noFill/>
+          </a:ln>
+        </p:spPr>
+        <p:txBody>
+          <a:bodyPr spcFirstLastPara="1" wrap="square" lIns="91425" tIns="45700" rIns="91425" bIns="45700" anchor="t" anchorCtr="0">
+            <a:normAutofit fontScale="92500" lnSpcReduction="20000"/>
+          </a:bodyPr>
+          <a:lstStyle>
+            <a:defPPr marR="0" lvl="0" algn="l" rtl="0">
+              <a:lnSpc>
+                <a:spcPct val="100000"/>
+              </a:lnSpc>
+              <a:spcBef>
+                <a:spcPts val="0"/>
+              </a:spcBef>
+              <a:spcAft>
+                <a:spcPts val="0"/>
+              </a:spcAft>
+            </a:defPPr>
+            <a:lvl1pPr marR="0" lvl="0" algn="l" rtl="0">
+              <a:lnSpc>
+                <a:spcPct val="100000"/>
+              </a:lnSpc>
+              <a:spcBef>
+                <a:spcPts val="0"/>
+              </a:spcBef>
+              <a:spcAft>
+                <a:spcPts val="0"/>
+              </a:spcAft>
+              <a:buClr>
+                <a:srgbClr val="000000"/>
+              </a:buClr>
+              <a:buFont typeface="Arial"/>
+              <a:defRPr sz="1400" b="0" i="0" u="none" strike="noStrike" cap="none">
+                <a:solidFill>
+                  <a:srgbClr val="000000"/>
+                </a:solidFill>
+                <a:latin typeface="Arial"/>
+                <a:ea typeface="Arial"/>
+                <a:cs typeface="Arial"/>
+                <a:sym typeface="Arial"/>
+              </a:defRPr>
+            </a:lvl1pPr>
+            <a:lvl2pPr marR="0" lvl="1" algn="l" rtl="0">
+              <a:lnSpc>
+                <a:spcPct val="100000"/>
+              </a:lnSpc>
+              <a:spcBef>
+                <a:spcPts val="0"/>
+              </a:spcBef>
+              <a:spcAft>
+                <a:spcPts val="0"/>
+              </a:spcAft>
+              <a:buClr>
+                <a:srgbClr val="000000"/>
+              </a:buClr>
+              <a:buFont typeface="Arial"/>
+              <a:defRPr sz="1400" b="0" i="0" u="none" strike="noStrike" cap="none">
+                <a:solidFill>
+                  <a:srgbClr val="000000"/>
+                </a:solidFill>
+                <a:latin typeface="Arial"/>
+                <a:ea typeface="Arial"/>
+                <a:cs typeface="Arial"/>
+                <a:sym typeface="Arial"/>
+              </a:defRPr>
+            </a:lvl2pPr>
+            <a:lvl3pPr marR="0" lvl="2" algn="l" rtl="0">
+              <a:lnSpc>
+                <a:spcPct val="100000"/>
+              </a:lnSpc>
+              <a:spcBef>
+                <a:spcPts val="0"/>
+              </a:spcBef>
+              <a:spcAft>
+                <a:spcPts val="0"/>
+              </a:spcAft>
+              <a:buClr>
+                <a:srgbClr val="000000"/>
+              </a:buClr>
+              <a:buFont typeface="Arial"/>
+              <a:defRPr sz="1400" b="0" i="0" u="none" strike="noStrike" cap="none">
+                <a:solidFill>
+                  <a:srgbClr val="000000"/>
+                </a:solidFill>
+                <a:latin typeface="Arial"/>
+                <a:ea typeface="Arial"/>
+                <a:cs typeface="Arial"/>
+                <a:sym typeface="Arial"/>
+              </a:defRPr>
+            </a:lvl3pPr>
+            <a:lvl4pPr marR="0" lvl="3" algn="l" rtl="0">
+              <a:lnSpc>
+                <a:spcPct val="100000"/>
+              </a:lnSpc>
+              <a:spcBef>
+                <a:spcPts val="0"/>
+              </a:spcBef>
+              <a:spcAft>
+                <a:spcPts val="0"/>
+              </a:spcAft>
+              <a:buClr>
+                <a:srgbClr val="000000"/>
+              </a:buClr>
+              <a:buFont typeface="Arial"/>
+              <a:defRPr sz="1400" b="0" i="0" u="none" strike="noStrike" cap="none">
+                <a:solidFill>
+                  <a:srgbClr val="000000"/>
+                </a:solidFill>
+                <a:latin typeface="Arial"/>
+                <a:ea typeface="Arial"/>
+                <a:cs typeface="Arial"/>
+                <a:sym typeface="Arial"/>
+              </a:defRPr>
+            </a:lvl4pPr>
+            <a:lvl5pPr marR="0" lvl="4" algn="l" rtl="0">
+              <a:lnSpc>
+                <a:spcPct val="100000"/>
+              </a:lnSpc>
+              <a:spcBef>
+                <a:spcPts val="0"/>
+              </a:spcBef>
+              <a:spcAft>
+                <a:spcPts val="0"/>
+              </a:spcAft>
+              <a:buClr>
+                <a:srgbClr val="000000"/>
+              </a:buClr>
+              <a:buFont typeface="Arial"/>
+              <a:defRPr sz="1400" b="0" i="0" u="none" strike="noStrike" cap="none">
+                <a:solidFill>
+                  <a:srgbClr val="000000"/>
+                </a:solidFill>
+                <a:latin typeface="Arial"/>
+                <a:ea typeface="Arial"/>
+                <a:cs typeface="Arial"/>
+                <a:sym typeface="Arial"/>
+              </a:defRPr>
+            </a:lvl5pPr>
+            <a:lvl6pPr marR="0" lvl="5" algn="l" rtl="0">
+              <a:lnSpc>
+                <a:spcPct val="100000"/>
+              </a:lnSpc>
+              <a:spcBef>
+                <a:spcPts val="0"/>
+              </a:spcBef>
+              <a:spcAft>
+                <a:spcPts val="0"/>
+              </a:spcAft>
+              <a:buClr>
+                <a:srgbClr val="000000"/>
+              </a:buClr>
+              <a:buFont typeface="Arial"/>
+              <a:defRPr sz="1400" b="0" i="0" u="none" strike="noStrike" cap="none">
+                <a:solidFill>
+                  <a:srgbClr val="000000"/>
+                </a:solidFill>
+                <a:latin typeface="Arial"/>
+                <a:ea typeface="Arial"/>
+                <a:cs typeface="Arial"/>
+                <a:sym typeface="Arial"/>
+              </a:defRPr>
+            </a:lvl6pPr>
+            <a:lvl7pPr marR="0" lvl="6" algn="l" rtl="0">
+              <a:lnSpc>
+                <a:spcPct val="100000"/>
+              </a:lnSpc>
+              <a:spcBef>
+                <a:spcPts val="0"/>
+              </a:spcBef>
+              <a:spcAft>
+                <a:spcPts val="0"/>
+              </a:spcAft>
+              <a:buClr>
+                <a:srgbClr val="000000"/>
+              </a:buClr>
+              <a:buFont typeface="Arial"/>
+              <a:defRPr sz="1400" b="0" i="0" u="none" strike="noStrike" cap="none">
+                <a:solidFill>
+                  <a:srgbClr val="000000"/>
+                </a:solidFill>
+                <a:latin typeface="Arial"/>
+                <a:ea typeface="Arial"/>
+                <a:cs typeface="Arial"/>
+                <a:sym typeface="Arial"/>
+              </a:defRPr>
+            </a:lvl7pPr>
+            <a:lvl8pPr marR="0" lvl="7" algn="l" rtl="0">
+              <a:lnSpc>
+                <a:spcPct val="100000"/>
+              </a:lnSpc>
+              <a:spcBef>
+                <a:spcPts val="0"/>
+              </a:spcBef>
+              <a:spcAft>
+                <a:spcPts val="0"/>
+              </a:spcAft>
+              <a:buClr>
+                <a:srgbClr val="000000"/>
+              </a:buClr>
+              <a:buFont typeface="Arial"/>
+              <a:defRPr sz="1400" b="0" i="0" u="none" strike="noStrike" cap="none">
+                <a:solidFill>
+                  <a:srgbClr val="000000"/>
+                </a:solidFill>
+                <a:latin typeface="Arial"/>
+                <a:ea typeface="Arial"/>
+                <a:cs typeface="Arial"/>
+                <a:sym typeface="Arial"/>
+              </a:defRPr>
+            </a:lvl8pPr>
+            <a:lvl9pPr marR="0" lvl="8" algn="l" rtl="0">
+              <a:lnSpc>
+                <a:spcPct val="100000"/>
+              </a:lnSpc>
+              <a:spcBef>
+                <a:spcPts val="0"/>
+              </a:spcBef>
+              <a:spcAft>
+                <a:spcPts val="0"/>
+              </a:spcAft>
+              <a:buClr>
+                <a:srgbClr val="000000"/>
+              </a:buClr>
+              <a:buFont typeface="Arial"/>
+              <a:defRPr sz="1400" b="0" i="0" u="none" strike="noStrike" cap="none">
+                <a:solidFill>
+                  <a:srgbClr val="000000"/>
+                </a:solidFill>
+                <a:latin typeface="Arial"/>
+                <a:ea typeface="Arial"/>
+                <a:cs typeface="Arial"/>
+                <a:sym typeface="Arial"/>
+              </a:defRPr>
+            </a:lvl9pPr>
+          </a:lstStyle>
+          <a:p>
+            <a:pPr marL="228600" lvl="0" indent="-228600">
+              <a:lnSpc>
+                <a:spcPct val="90000"/>
+              </a:lnSpc>
+              <a:spcBef>
+                <a:spcPts val="1000"/>
+              </a:spcBef>
+              <a:buClr>
+                <a:srgbClr val="2F5496"/>
+              </a:buClr>
+              <a:buSzPts val="2000"/>
+              <a:buFont typeface="Arial"/>
+              <a:buChar char="•"/>
+            </a:pPr>
+            <a:r>
+              <a:rPr lang="en-US" sz="2800" dirty="0">
+                <a:solidFill>
+                  <a:srgbClr val="2F5496"/>
+                </a:solidFill>
+                <a:latin typeface="Calibri"/>
+                <a:cs typeface="Calibri"/>
+                <a:sym typeface="Calibri"/>
+              </a:rPr>
+              <a:t>Create new app from templates</a:t>
+            </a:r>
+          </a:p>
+          <a:p>
+            <a:pPr marL="228600" lvl="0" indent="-228600">
+              <a:lnSpc>
+                <a:spcPct val="90000"/>
+              </a:lnSpc>
+              <a:spcBef>
+                <a:spcPts val="1000"/>
+              </a:spcBef>
+              <a:buClr>
+                <a:srgbClr val="2F5496"/>
+              </a:buClr>
+              <a:buSzPts val="2000"/>
+              <a:buFont typeface="Arial"/>
+              <a:buChar char="•"/>
+            </a:pPr>
+            <a:r>
+              <a:rPr lang="en-US" sz="2800" dirty="0">
+                <a:solidFill>
+                  <a:srgbClr val="2F5496"/>
+                </a:solidFill>
+                <a:latin typeface="Calibri"/>
+                <a:cs typeface="Calibri"/>
+                <a:sym typeface="Calibri"/>
+              </a:rPr>
+              <a:t>Different color! Why?</a:t>
+            </a:r>
+          </a:p>
+          <a:p>
+            <a:pPr marL="228600" lvl="0" indent="-228600">
+              <a:lnSpc>
+                <a:spcPct val="90000"/>
+              </a:lnSpc>
+              <a:spcBef>
+                <a:spcPts val="1000"/>
+              </a:spcBef>
+              <a:buClr>
+                <a:srgbClr val="2F5496"/>
+              </a:buClr>
+              <a:buSzPts val="2000"/>
+              <a:buFont typeface="Arial"/>
+              <a:buChar char="•"/>
+            </a:pPr>
+            <a:r>
+              <a:rPr lang="en-US" sz="2800" dirty="0">
+                <a:solidFill>
+                  <a:srgbClr val="2F5496"/>
+                </a:solidFill>
+                <a:latin typeface="Calibri"/>
+                <a:cs typeface="Calibri"/>
+                <a:sym typeface="Calibri"/>
+              </a:rPr>
+              <a:t>What is the Fiori guideline?</a:t>
+            </a:r>
+          </a:p>
+          <a:p>
+            <a:pPr marL="228600" lvl="0" indent="-228600">
+              <a:lnSpc>
+                <a:spcPct val="90000"/>
+              </a:lnSpc>
+              <a:spcBef>
+                <a:spcPts val="1000"/>
+              </a:spcBef>
+              <a:buClr>
+                <a:srgbClr val="2F5496"/>
+              </a:buClr>
+              <a:buSzPts val="2000"/>
+              <a:buFont typeface="Arial"/>
+              <a:buChar char="•"/>
+            </a:pPr>
+            <a:r>
+              <a:rPr lang="en-US" sz="2800" dirty="0">
+                <a:solidFill>
+                  <a:srgbClr val="2F5496"/>
+                </a:solidFill>
+                <a:latin typeface="Calibri"/>
+                <a:cs typeface="Calibri"/>
+                <a:sym typeface="Calibri"/>
+              </a:rPr>
+              <a:t>What’s the `</a:t>
+            </a:r>
+            <a:r>
+              <a:rPr lang="en-US" sz="2800" dirty="0" err="1">
+                <a:solidFill>
+                  <a:srgbClr val="92D050"/>
+                </a:solidFill>
+                <a:latin typeface="Calibri"/>
+                <a:cs typeface="Calibri"/>
+                <a:sym typeface="Calibri"/>
+              </a:rPr>
+              <a:t>manifest.json</a:t>
+            </a:r>
+            <a:r>
+              <a:rPr lang="en-US" sz="2800" dirty="0">
+                <a:solidFill>
+                  <a:srgbClr val="2F5496"/>
+                </a:solidFill>
+                <a:latin typeface="Calibri"/>
+                <a:cs typeface="Calibri"/>
+                <a:sym typeface="Calibri"/>
+              </a:rPr>
+              <a:t>` file?</a:t>
+            </a:r>
+          </a:p>
+          <a:p>
+            <a:pPr indent="127000">
+              <a:lnSpc>
+                <a:spcPct val="90000"/>
+              </a:lnSpc>
+              <a:spcBef>
+                <a:spcPts val="1000"/>
+              </a:spcBef>
+              <a:buClr>
+                <a:srgbClr val="2F5496"/>
+              </a:buClr>
+              <a:buSzPts val="2000"/>
+            </a:pPr>
+            <a:endParaRPr lang="en-US" sz="2000" dirty="0"/>
           </a:p>
         </p:txBody>
       </p:sp>

</xml_diff>

<commit_message>
App 5 shows the layout editor usage and i18n
</commit_message>
<xml_diff>
--- a/Presentations/UI5_002.pptx
+++ b/Presentations/UI5_002.pptx
@@ -5,7 +5,7 @@
     <p:sldMasterId id="2147483648" r:id="rId1"/>
   </p:sldMasterIdLst>
   <p:notesMasterIdLst>
-    <p:notesMasterId r:id="rId7"/>
+    <p:notesMasterId r:id="rId8"/>
   </p:notesMasterIdLst>
   <p:sldIdLst>
     <p:sldId id="256" r:id="rId2"/>
@@ -13,6 +13,7 @@
     <p:sldId id="269" r:id="rId4"/>
     <p:sldId id="264" r:id="rId5"/>
     <p:sldId id="267" r:id="rId6"/>
+    <p:sldId id="270" r:id="rId7"/>
   </p:sldIdLst>
   <p:sldSz cx="12192000" cy="6858000"/>
   <p:notesSz cx="6858000" cy="9144000"/>
@@ -250,7 +251,7 @@
       <p15:sldGuideLst xmlns:p15="http://schemas.microsoft.com/office/powerpoint/2012/main"/>
     </p:ext>
     <p:ext uri="http://customooxmlschemas.google.com/">
-      <go:slidesCustomData xmlns:go="http://customooxmlschemas.google.com/" xmlns:p15="http://schemas.microsoft.com/office/powerpoint/2012/main" xmlns:p14="http://schemas.microsoft.com/office/powerpoint/2010/main" xmlns:com="http://schemas.openxmlformats.org/drawingml/2006/compatibility" xmlns:pvml="urn:schemas-microsoft-com:office:powerpoint" xmlns:v="urn:schemas-microsoft-com:vml" xmlns:o="urn:schemas-microsoft-com:office:office" xmlns:dgm="http://schemas.openxmlformats.org/drawingml/2006/diagram" xmlns:c="http://schemas.openxmlformats.org/drawingml/2006/chart" xmlns:mv="urn:schemas-microsoft-com:mac:vml" xmlns:mc="http://schemas.openxmlformats.org/markup-compatibility/2006" xmlns="" r:id="rId16" roundtripDataSignature="AMtx7mhcB0blr/SQn/d9pBN/m19CWvRtWQ=="/>
+      <go:slidesCustomData xmlns="" xmlns:mc="http://schemas.openxmlformats.org/markup-compatibility/2006" xmlns:mv="urn:schemas-microsoft-com:mac:vml" xmlns:c="http://schemas.openxmlformats.org/drawingml/2006/chart" xmlns:dgm="http://schemas.openxmlformats.org/drawingml/2006/diagram" xmlns:o="urn:schemas-microsoft-com:office:office" xmlns:v="urn:schemas-microsoft-com:vml" xmlns:pvml="urn:schemas-microsoft-com:office:powerpoint" xmlns:com="http://schemas.openxmlformats.org/drawingml/2006/compatibility" xmlns:p14="http://schemas.microsoft.com/office/powerpoint/2010/main" xmlns:p15="http://schemas.microsoft.com/office/powerpoint/2012/main" xmlns:go="http://customooxmlschemas.google.com/" r:id="rId16" roundtripDataSignature="AMtx7mhcB0blr/SQn/d9pBN/m19CWvRtWQ=="/>
     </p:ext>
   </p:extLst>
 </p:presentation>
@@ -1083,6 +1084,72 @@
     <p:extLst>
       <p:ext uri="{BB962C8B-B14F-4D97-AF65-F5344CB8AC3E}">
         <p14:creationId xmlns:p14="http://schemas.microsoft.com/office/powerpoint/2010/main" val="373171878"/>
+      </p:ext>
+    </p:extLst>
+  </p:cSld>
+  <p:clrMapOvr>
+    <a:masterClrMapping/>
+  </p:clrMapOvr>
+</p:notes>
+</file>
+
+<file path=ppt/notesSlides/notesSlide5.xml><?xml version="1.0" encoding="utf-8"?>
+<p:notes xmlns:a="http://schemas.openxmlformats.org/drawingml/2006/main" xmlns:r="http://schemas.openxmlformats.org/officeDocument/2006/relationships" xmlns:p="http://schemas.openxmlformats.org/presentationml/2006/main">
+  <p:cSld>
+    <p:spTree>
+      <p:nvGrpSpPr>
+        <p:cNvPr id="1" name=""/>
+        <p:cNvGrpSpPr/>
+        <p:nvPr/>
+      </p:nvGrpSpPr>
+      <p:grpSpPr>
+        <a:xfrm>
+          <a:off x="0" y="0"/>
+          <a:ext cx="0" cy="0"/>
+          <a:chOff x="0" y="0"/>
+          <a:chExt cx="0" cy="0"/>
+        </a:xfrm>
+      </p:grpSpPr>
+      <p:sp>
+        <p:nvSpPr>
+          <p:cNvPr id="2" name="Slide Image Placeholder 1"/>
+          <p:cNvSpPr>
+            <a:spLocks noGrp="1" noRot="1" noChangeAspect="1"/>
+          </p:cNvSpPr>
+          <p:nvPr>
+            <p:ph type="sldImg"/>
+          </p:nvPr>
+        </p:nvSpPr>
+        <p:spPr>
+          <a:xfrm>
+            <a:off x="381000" y="685800"/>
+            <a:ext cx="6096000" cy="3429000"/>
+          </a:xfrm>
+        </p:spPr>
+      </p:sp>
+      <p:sp>
+        <p:nvSpPr>
+          <p:cNvPr id="3" name="Notes Placeholder 2"/>
+          <p:cNvSpPr>
+            <a:spLocks noGrp="1"/>
+          </p:cNvSpPr>
+          <p:nvPr>
+            <p:ph type="body" idx="1"/>
+          </p:nvPr>
+        </p:nvSpPr>
+        <p:spPr/>
+        <p:txBody>
+          <a:bodyPr/>
+          <a:lstStyle/>
+          <a:p>
+            <a:endParaRPr lang="en-US" dirty="0"/>
+          </a:p>
+        </p:txBody>
+      </p:sp>
+    </p:spTree>
+    <p:extLst>
+      <p:ext uri="{BB962C8B-B14F-4D97-AF65-F5344CB8AC3E}">
+        <p14:creationId xmlns:p14="http://schemas.microsoft.com/office/powerpoint/2010/main" val="473557042"/>
       </p:ext>
     </p:extLst>
   </p:cSld>
@@ -10025,6 +10092,482 @@
 </p:sld>
 </file>
 
+<file path=ppt/slides/slide6.xml><?xml version="1.0" encoding="utf-8"?>
+<p:sld xmlns:a="http://schemas.openxmlformats.org/drawingml/2006/main" xmlns:r="http://schemas.openxmlformats.org/officeDocument/2006/relationships" xmlns:p="http://schemas.openxmlformats.org/presentationml/2006/main">
+  <p:cSld>
+    <p:spTree>
+      <p:nvGrpSpPr>
+        <p:cNvPr id="1" name=""/>
+        <p:cNvGrpSpPr/>
+        <p:nvPr/>
+      </p:nvGrpSpPr>
+      <p:grpSpPr>
+        <a:xfrm>
+          <a:off x="0" y="0"/>
+          <a:ext cx="0" cy="0"/>
+          <a:chOff x="0" y="0"/>
+          <a:chExt cx="0" cy="0"/>
+        </a:xfrm>
+      </p:grpSpPr>
+      <p:sp>
+        <p:nvSpPr>
+          <p:cNvPr id="2" name="Title 1">
+            <a:extLst>
+              <a:ext uri="{FF2B5EF4-FFF2-40B4-BE49-F238E27FC236}">
+                <a16:creationId xmlns:a16="http://schemas.microsoft.com/office/drawing/2014/main" id="{8B45E4C9-DB1E-4CA5-8EB5-78E59F7F1576}"/>
+              </a:ext>
+            </a:extLst>
+          </p:cNvPr>
+          <p:cNvSpPr>
+            <a:spLocks noGrp="1"/>
+          </p:cNvSpPr>
+          <p:nvPr>
+            <p:ph type="title"/>
+          </p:nvPr>
+        </p:nvSpPr>
+        <p:spPr/>
+        <p:txBody>
+          <a:bodyPr/>
+          <a:lstStyle/>
+          <a:p>
+            <a:r>
+              <a:rPr lang="en-US" dirty="0"/>
+              <a:t>App#5: Start with a blank template!</a:t>
+            </a:r>
+          </a:p>
+        </p:txBody>
+      </p:sp>
+      <p:sp>
+        <p:nvSpPr>
+          <p:cNvPr id="8" name="Google Shape;115;p3">
+            <a:extLst>
+              <a:ext uri="{FF2B5EF4-FFF2-40B4-BE49-F238E27FC236}">
+                <a16:creationId xmlns:a16="http://schemas.microsoft.com/office/drawing/2014/main" id="{C0AB04CB-4518-4E43-A2EB-CD6B4230FD82}"/>
+              </a:ext>
+            </a:extLst>
+          </p:cNvPr>
+          <p:cNvSpPr txBox="1">
+            <a:spLocks/>
+          </p:cNvSpPr>
+          <p:nvPr/>
+        </p:nvSpPr>
+        <p:spPr>
+          <a:xfrm>
+            <a:off x="152400" y="1513841"/>
+            <a:ext cx="4787294" cy="1788160"/>
+          </a:xfrm>
+          <a:prstGeom prst="rect">
+            <a:avLst/>
+          </a:prstGeom>
+          <a:noFill/>
+          <a:ln>
+            <a:noFill/>
+          </a:ln>
+        </p:spPr>
+        <p:txBody>
+          <a:bodyPr spcFirstLastPara="1" wrap="square" lIns="91425" tIns="45700" rIns="91425" bIns="45700" anchor="t" anchorCtr="0">
+            <a:normAutofit/>
+          </a:bodyPr>
+          <a:lstStyle>
+            <a:defPPr marR="0" lvl="0" algn="l" rtl="0">
+              <a:lnSpc>
+                <a:spcPct val="100000"/>
+              </a:lnSpc>
+              <a:spcBef>
+                <a:spcPts val="0"/>
+              </a:spcBef>
+              <a:spcAft>
+                <a:spcPts val="0"/>
+              </a:spcAft>
+            </a:defPPr>
+            <a:lvl1pPr marR="0" lvl="0" algn="l" rtl="0">
+              <a:lnSpc>
+                <a:spcPct val="100000"/>
+              </a:lnSpc>
+              <a:spcBef>
+                <a:spcPts val="0"/>
+              </a:spcBef>
+              <a:spcAft>
+                <a:spcPts val="0"/>
+              </a:spcAft>
+              <a:buClr>
+                <a:srgbClr val="000000"/>
+              </a:buClr>
+              <a:buFont typeface="Arial"/>
+              <a:defRPr sz="1400" b="0" i="0" u="none" strike="noStrike" cap="none">
+                <a:solidFill>
+                  <a:srgbClr val="000000"/>
+                </a:solidFill>
+                <a:latin typeface="Arial"/>
+                <a:ea typeface="Arial"/>
+                <a:cs typeface="Arial"/>
+                <a:sym typeface="Arial"/>
+              </a:defRPr>
+            </a:lvl1pPr>
+            <a:lvl2pPr marR="0" lvl="1" algn="l" rtl="0">
+              <a:lnSpc>
+                <a:spcPct val="100000"/>
+              </a:lnSpc>
+              <a:spcBef>
+                <a:spcPts val="0"/>
+              </a:spcBef>
+              <a:spcAft>
+                <a:spcPts val="0"/>
+              </a:spcAft>
+              <a:buClr>
+                <a:srgbClr val="000000"/>
+              </a:buClr>
+              <a:buFont typeface="Arial"/>
+              <a:defRPr sz="1400" b="0" i="0" u="none" strike="noStrike" cap="none">
+                <a:solidFill>
+                  <a:srgbClr val="000000"/>
+                </a:solidFill>
+                <a:latin typeface="Arial"/>
+                <a:ea typeface="Arial"/>
+                <a:cs typeface="Arial"/>
+                <a:sym typeface="Arial"/>
+              </a:defRPr>
+            </a:lvl2pPr>
+            <a:lvl3pPr marR="0" lvl="2" algn="l" rtl="0">
+              <a:lnSpc>
+                <a:spcPct val="100000"/>
+              </a:lnSpc>
+              <a:spcBef>
+                <a:spcPts val="0"/>
+              </a:spcBef>
+              <a:spcAft>
+                <a:spcPts val="0"/>
+              </a:spcAft>
+              <a:buClr>
+                <a:srgbClr val="000000"/>
+              </a:buClr>
+              <a:buFont typeface="Arial"/>
+              <a:defRPr sz="1400" b="0" i="0" u="none" strike="noStrike" cap="none">
+                <a:solidFill>
+                  <a:srgbClr val="000000"/>
+                </a:solidFill>
+                <a:latin typeface="Arial"/>
+                <a:ea typeface="Arial"/>
+                <a:cs typeface="Arial"/>
+                <a:sym typeface="Arial"/>
+              </a:defRPr>
+            </a:lvl3pPr>
+            <a:lvl4pPr marR="0" lvl="3" algn="l" rtl="0">
+              <a:lnSpc>
+                <a:spcPct val="100000"/>
+              </a:lnSpc>
+              <a:spcBef>
+                <a:spcPts val="0"/>
+              </a:spcBef>
+              <a:spcAft>
+                <a:spcPts val="0"/>
+              </a:spcAft>
+              <a:buClr>
+                <a:srgbClr val="000000"/>
+              </a:buClr>
+              <a:buFont typeface="Arial"/>
+              <a:defRPr sz="1400" b="0" i="0" u="none" strike="noStrike" cap="none">
+                <a:solidFill>
+                  <a:srgbClr val="000000"/>
+                </a:solidFill>
+                <a:latin typeface="Arial"/>
+                <a:ea typeface="Arial"/>
+                <a:cs typeface="Arial"/>
+                <a:sym typeface="Arial"/>
+              </a:defRPr>
+            </a:lvl4pPr>
+            <a:lvl5pPr marR="0" lvl="4" algn="l" rtl="0">
+              <a:lnSpc>
+                <a:spcPct val="100000"/>
+              </a:lnSpc>
+              <a:spcBef>
+                <a:spcPts val="0"/>
+              </a:spcBef>
+              <a:spcAft>
+                <a:spcPts val="0"/>
+              </a:spcAft>
+              <a:buClr>
+                <a:srgbClr val="000000"/>
+              </a:buClr>
+              <a:buFont typeface="Arial"/>
+              <a:defRPr sz="1400" b="0" i="0" u="none" strike="noStrike" cap="none">
+                <a:solidFill>
+                  <a:srgbClr val="000000"/>
+                </a:solidFill>
+                <a:latin typeface="Arial"/>
+                <a:ea typeface="Arial"/>
+                <a:cs typeface="Arial"/>
+                <a:sym typeface="Arial"/>
+              </a:defRPr>
+            </a:lvl5pPr>
+            <a:lvl6pPr marR="0" lvl="5" algn="l" rtl="0">
+              <a:lnSpc>
+                <a:spcPct val="100000"/>
+              </a:lnSpc>
+              <a:spcBef>
+                <a:spcPts val="0"/>
+              </a:spcBef>
+              <a:spcAft>
+                <a:spcPts val="0"/>
+              </a:spcAft>
+              <a:buClr>
+                <a:srgbClr val="000000"/>
+              </a:buClr>
+              <a:buFont typeface="Arial"/>
+              <a:defRPr sz="1400" b="0" i="0" u="none" strike="noStrike" cap="none">
+                <a:solidFill>
+                  <a:srgbClr val="000000"/>
+                </a:solidFill>
+                <a:latin typeface="Arial"/>
+                <a:ea typeface="Arial"/>
+                <a:cs typeface="Arial"/>
+                <a:sym typeface="Arial"/>
+              </a:defRPr>
+            </a:lvl6pPr>
+            <a:lvl7pPr marR="0" lvl="6" algn="l" rtl="0">
+              <a:lnSpc>
+                <a:spcPct val="100000"/>
+              </a:lnSpc>
+              <a:spcBef>
+                <a:spcPts val="0"/>
+              </a:spcBef>
+              <a:spcAft>
+                <a:spcPts val="0"/>
+              </a:spcAft>
+              <a:buClr>
+                <a:srgbClr val="000000"/>
+              </a:buClr>
+              <a:buFont typeface="Arial"/>
+              <a:defRPr sz="1400" b="0" i="0" u="none" strike="noStrike" cap="none">
+                <a:solidFill>
+                  <a:srgbClr val="000000"/>
+                </a:solidFill>
+                <a:latin typeface="Arial"/>
+                <a:ea typeface="Arial"/>
+                <a:cs typeface="Arial"/>
+                <a:sym typeface="Arial"/>
+              </a:defRPr>
+            </a:lvl7pPr>
+            <a:lvl8pPr marR="0" lvl="7" algn="l" rtl="0">
+              <a:lnSpc>
+                <a:spcPct val="100000"/>
+              </a:lnSpc>
+              <a:spcBef>
+                <a:spcPts val="0"/>
+              </a:spcBef>
+              <a:spcAft>
+                <a:spcPts val="0"/>
+              </a:spcAft>
+              <a:buClr>
+                <a:srgbClr val="000000"/>
+              </a:buClr>
+              <a:buFont typeface="Arial"/>
+              <a:defRPr sz="1400" b="0" i="0" u="none" strike="noStrike" cap="none">
+                <a:solidFill>
+                  <a:srgbClr val="000000"/>
+                </a:solidFill>
+                <a:latin typeface="Arial"/>
+                <a:ea typeface="Arial"/>
+                <a:cs typeface="Arial"/>
+                <a:sym typeface="Arial"/>
+              </a:defRPr>
+            </a:lvl8pPr>
+            <a:lvl9pPr marR="0" lvl="8" algn="l" rtl="0">
+              <a:lnSpc>
+                <a:spcPct val="100000"/>
+              </a:lnSpc>
+              <a:spcBef>
+                <a:spcPts val="0"/>
+              </a:spcBef>
+              <a:spcAft>
+                <a:spcPts val="0"/>
+              </a:spcAft>
+              <a:buClr>
+                <a:srgbClr val="000000"/>
+              </a:buClr>
+              <a:buFont typeface="Arial"/>
+              <a:defRPr sz="1400" b="0" i="0" u="none" strike="noStrike" cap="none">
+                <a:solidFill>
+                  <a:srgbClr val="000000"/>
+                </a:solidFill>
+                <a:latin typeface="Arial"/>
+                <a:ea typeface="Arial"/>
+                <a:cs typeface="Arial"/>
+                <a:sym typeface="Arial"/>
+              </a:defRPr>
+            </a:lvl9pPr>
+          </a:lstStyle>
+          <a:p>
+            <a:pPr marL="228600" lvl="0" indent="-228600">
+              <a:lnSpc>
+                <a:spcPct val="90000"/>
+              </a:lnSpc>
+              <a:spcBef>
+                <a:spcPts val="1000"/>
+              </a:spcBef>
+              <a:buClr>
+                <a:srgbClr val="2F5496"/>
+              </a:buClr>
+              <a:buSzPts val="2000"/>
+              <a:buFont typeface="Arial"/>
+              <a:buChar char="•"/>
+            </a:pPr>
+            <a:r>
+              <a:rPr lang="en-US" sz="2800" dirty="0">
+                <a:solidFill>
+                  <a:srgbClr val="2F5496"/>
+                </a:solidFill>
+                <a:latin typeface="Calibri"/>
+                <a:cs typeface="Calibri"/>
+                <a:sym typeface="Calibri"/>
+              </a:rPr>
+              <a:t>Layout Editor vs. Code Editor</a:t>
+            </a:r>
+          </a:p>
+          <a:p>
+            <a:pPr marL="228600" lvl="0" indent="-228600">
+              <a:lnSpc>
+                <a:spcPct val="90000"/>
+              </a:lnSpc>
+              <a:spcBef>
+                <a:spcPts val="1000"/>
+              </a:spcBef>
+              <a:buClr>
+                <a:srgbClr val="2F5496"/>
+              </a:buClr>
+              <a:buSzPts val="2000"/>
+              <a:buFont typeface="Arial"/>
+              <a:buChar char="•"/>
+            </a:pPr>
+            <a:r>
+              <a:rPr lang="en-US" sz="2800" dirty="0">
+                <a:solidFill>
+                  <a:srgbClr val="2F5496"/>
+                </a:solidFill>
+                <a:latin typeface="Calibri"/>
+                <a:cs typeface="Calibri"/>
+                <a:sym typeface="Calibri"/>
+              </a:rPr>
+              <a:t>Controls &amp; UX design </a:t>
+            </a:r>
+          </a:p>
+          <a:p>
+            <a:pPr marL="228600" lvl="0" indent="-228600">
+              <a:lnSpc>
+                <a:spcPct val="90000"/>
+              </a:lnSpc>
+              <a:spcBef>
+                <a:spcPts val="1000"/>
+              </a:spcBef>
+              <a:buClr>
+                <a:srgbClr val="2F5496"/>
+              </a:buClr>
+              <a:buSzPts val="2000"/>
+              <a:buFont typeface="Arial"/>
+              <a:buChar char="•"/>
+            </a:pPr>
+            <a:r>
+              <a:rPr lang="en-US" sz="2800" dirty="0">
+                <a:solidFill>
+                  <a:srgbClr val="2F5496"/>
+                </a:solidFill>
+                <a:latin typeface="Calibri"/>
+                <a:cs typeface="Calibri"/>
+                <a:sym typeface="Calibri"/>
+              </a:rPr>
+              <a:t>i18n </a:t>
+            </a:r>
+          </a:p>
+          <a:p>
+            <a:pPr indent="127000">
+              <a:lnSpc>
+                <a:spcPct val="90000"/>
+              </a:lnSpc>
+              <a:spcBef>
+                <a:spcPts val="1000"/>
+              </a:spcBef>
+              <a:buClr>
+                <a:srgbClr val="2F5496"/>
+              </a:buClr>
+              <a:buSzPts val="2000"/>
+            </a:pPr>
+            <a:endParaRPr lang="en-US" sz="2000" dirty="0"/>
+          </a:p>
+        </p:txBody>
+      </p:sp>
+      <p:pic>
+        <p:nvPicPr>
+          <p:cNvPr id="5" name="Picture 4" descr="A screenshot of a cell phone&#10;&#10;Description automatically generated">
+            <a:extLst>
+              <a:ext uri="{FF2B5EF4-FFF2-40B4-BE49-F238E27FC236}">
+                <a16:creationId xmlns:a16="http://schemas.microsoft.com/office/drawing/2014/main" id="{3C771A40-5B3F-4827-BD1A-3B5D91417464}"/>
+              </a:ext>
+            </a:extLst>
+          </p:cNvPr>
+          <p:cNvPicPr>
+            <a:picLocks noChangeAspect="1"/>
+          </p:cNvPicPr>
+          <p:nvPr/>
+        </p:nvPicPr>
+        <p:blipFill>
+          <a:blip r:embed="rId3"/>
+          <a:stretch>
+            <a:fillRect/>
+          </a:stretch>
+        </p:blipFill>
+        <p:spPr>
+          <a:xfrm>
+            <a:off x="3872510" y="2166622"/>
+            <a:ext cx="6080382" cy="4568190"/>
+          </a:xfrm>
+          <a:prstGeom prst="rect">
+            <a:avLst/>
+          </a:prstGeom>
+        </p:spPr>
+      </p:pic>
+      <p:pic>
+        <p:nvPicPr>
+          <p:cNvPr id="9" name="Picture 8" descr="A screenshot of a cell phone&#10;&#10;Description automatically generated">
+            <a:extLst>
+              <a:ext uri="{FF2B5EF4-FFF2-40B4-BE49-F238E27FC236}">
+                <a16:creationId xmlns:a16="http://schemas.microsoft.com/office/drawing/2014/main" id="{D22A3921-E39E-4413-B3CE-D443216B180C}"/>
+              </a:ext>
+            </a:extLst>
+          </p:cNvPr>
+          <p:cNvPicPr>
+            <a:picLocks noChangeAspect="1"/>
+          </p:cNvPicPr>
+          <p:nvPr/>
+        </p:nvPicPr>
+        <p:blipFill>
+          <a:blip r:embed="rId4"/>
+          <a:stretch>
+            <a:fillRect/>
+          </a:stretch>
+        </p:blipFill>
+        <p:spPr>
+          <a:xfrm>
+            <a:off x="1157345" y="3248979"/>
+            <a:ext cx="1710221" cy="3485833"/>
+          </a:xfrm>
+          <a:prstGeom prst="rect">
+            <a:avLst/>
+          </a:prstGeom>
+        </p:spPr>
+      </p:pic>
+    </p:spTree>
+    <p:extLst>
+      <p:ext uri="{BB962C8B-B14F-4D97-AF65-F5344CB8AC3E}">
+        <p14:creationId xmlns:p14="http://schemas.microsoft.com/office/powerpoint/2010/main" val="458018679"/>
+      </p:ext>
+    </p:extLst>
+  </p:cSld>
+  <p:clrMapOvr>
+    <a:masterClrMapping/>
+  </p:clrMapOvr>
+</p:sld>
+</file>
+
 <file path=ppt/theme/theme1.xml><?xml version="1.0" encoding="utf-8"?>
 <a:theme xmlns:a="http://schemas.openxmlformats.org/drawingml/2006/main" name="Office">
   <a:themeElements>

</xml_diff>

<commit_message>
New tasks in app6
</commit_message>
<xml_diff>
--- a/Presentations/UI5_002.pptx
+++ b/Presentations/UI5_002.pptx
@@ -10685,7 +10685,7 @@
         <p:spPr>
           <a:xfrm>
             <a:off x="152400" y="1513840"/>
-            <a:ext cx="4787294" cy="5120639"/>
+            <a:ext cx="4787294" cy="4673599"/>
           </a:xfrm>
           <a:prstGeom prst="rect">
             <a:avLst/>
@@ -10697,7 +10697,7 @@
         </p:spPr>
         <p:txBody>
           <a:bodyPr spcFirstLastPara="1" wrap="square" lIns="91425" tIns="45700" rIns="91425" bIns="45700" anchor="t" anchorCtr="0">
-            <a:normAutofit/>
+            <a:normAutofit lnSpcReduction="10000"/>
           </a:bodyPr>
           <a:lstStyle>
             <a:defPPr marR="0" lvl="0" algn="l" rtl="0">
@@ -11064,7 +11064,7 @@
             </a:r>
           </a:p>
           <a:p>
-            <a:pPr indent="127000">
+            <a:pPr marL="228600" lvl="0" indent="-228600">
               <a:lnSpc>
                 <a:spcPct val="90000"/>
               </a:lnSpc>
@@ -11075,8 +11075,101 @@
                 <a:srgbClr val="2F5496"/>
               </a:buClr>
               <a:buSzPts val="2000"/>
+              <a:buFont typeface="Arial"/>
+              <a:buChar char="•"/>
             </a:pPr>
-            <a:endParaRPr lang="en-US" sz="2000" dirty="0"/>
+            <a:r>
+              <a:rPr lang="en-US" sz="2800" dirty="0">
+                <a:solidFill>
+                  <a:srgbClr val="2F5496"/>
+                </a:solidFill>
+                <a:latin typeface="Calibri"/>
+                <a:cs typeface="Calibri"/>
+                <a:sym typeface="Calibri"/>
+              </a:rPr>
+              <a:t>SAP Translation Hub</a:t>
+            </a:r>
+          </a:p>
+          <a:p>
+            <a:pPr marL="228600" lvl="0" indent="-228600">
+              <a:lnSpc>
+                <a:spcPct val="90000"/>
+              </a:lnSpc>
+              <a:spcBef>
+                <a:spcPts val="1000"/>
+              </a:spcBef>
+              <a:buClr>
+                <a:srgbClr val="2F5496"/>
+              </a:buClr>
+              <a:buSzPts val="2000"/>
+              <a:buFont typeface="Arial"/>
+              <a:buChar char="•"/>
+            </a:pPr>
+            <a:r>
+              <a:rPr lang="en-US" sz="2800" dirty="0">
+                <a:solidFill>
+                  <a:srgbClr val="2F5496"/>
+                </a:solidFill>
+                <a:latin typeface="Calibri"/>
+                <a:cs typeface="Calibri"/>
+                <a:sym typeface="Calibri"/>
+              </a:rPr>
+              <a:t>Deploy</a:t>
+            </a:r>
+          </a:p>
+          <a:p>
+            <a:pPr marL="228600" lvl="0" indent="-228600">
+              <a:lnSpc>
+                <a:spcPct val="90000"/>
+              </a:lnSpc>
+              <a:spcBef>
+                <a:spcPts val="1000"/>
+              </a:spcBef>
+              <a:buClr>
+                <a:srgbClr val="2F5496"/>
+              </a:buClr>
+              <a:buSzPts val="2000"/>
+              <a:buFont typeface="Arial"/>
+              <a:buChar char="•"/>
+            </a:pPr>
+            <a:r>
+              <a:rPr lang="en-US" sz="2800" dirty="0">
+                <a:solidFill>
+                  <a:srgbClr val="2F5496"/>
+                </a:solidFill>
+                <a:latin typeface="Calibri"/>
+                <a:cs typeface="Calibri"/>
+                <a:sym typeface="Calibri"/>
+              </a:rPr>
+              <a:t>Git</a:t>
+            </a:r>
+          </a:p>
+          <a:p>
+            <a:pPr marL="228600" lvl="0" indent="-228600">
+              <a:lnSpc>
+                <a:spcPct val="90000"/>
+              </a:lnSpc>
+              <a:spcBef>
+                <a:spcPts val="1000"/>
+              </a:spcBef>
+              <a:buClr>
+                <a:srgbClr val="2F5496"/>
+              </a:buClr>
+              <a:buSzPts val="2000"/>
+              <a:buFont typeface="Arial"/>
+              <a:buChar char="•"/>
+            </a:pPr>
+            <a:r>
+              <a:rPr lang="en-US" sz="2800" dirty="0">
+                <a:solidFill>
+                  <a:srgbClr val="2F5496"/>
+                </a:solidFill>
+                <a:latin typeface="Calibri"/>
+                <a:cs typeface="Calibri"/>
+                <a:sym typeface="Calibri"/>
+              </a:rPr>
+              <a:t>Auto generate translations</a:t>
+            </a:r>
           </a:p>
         </p:txBody>
       </p:sp>
@@ -11102,7 +11195,7 @@
         </p:blipFill>
         <p:spPr>
           <a:xfrm>
-            <a:off x="4291233" y="1315604"/>
+            <a:off x="4362353" y="1315604"/>
             <a:ext cx="5661660" cy="5478780"/>
           </a:xfrm>
           <a:prstGeom prst="rect">
@@ -11132,7 +11225,7 @@
         </p:blipFill>
         <p:spPr>
           <a:xfrm>
-            <a:off x="308537" y="4118610"/>
+            <a:off x="6201337" y="4125076"/>
             <a:ext cx="3826559" cy="2675774"/>
           </a:xfrm>
           <a:prstGeom prst="rect">
@@ -11140,6 +11233,55 @@
           </a:prstGeom>
         </p:spPr>
       </p:pic>
+      <p:sp>
+        <p:nvSpPr>
+          <p:cNvPr id="6" name="Rectangle: Rounded Corners 5">
+            <a:hlinkClick r:id="rId5"/>
+            <a:extLst>
+              <a:ext uri="{FF2B5EF4-FFF2-40B4-BE49-F238E27FC236}">
+                <a16:creationId xmlns:a16="http://schemas.microsoft.com/office/drawing/2014/main" id="{AEA5105F-CEBB-4BA1-B028-504C6E1F4814}"/>
+              </a:ext>
+            </a:extLst>
+          </p:cNvPr>
+          <p:cNvSpPr/>
+          <p:nvPr/>
+        </p:nvSpPr>
+        <p:spPr>
+          <a:xfrm>
+            <a:off x="853440" y="5963920"/>
+            <a:ext cx="2621280" cy="680720"/>
+          </a:xfrm>
+          <a:prstGeom prst="roundRect">
+            <a:avLst/>
+          </a:prstGeom>
+          <a:ln/>
+        </p:spPr>
+        <p:style>
+          <a:lnRef idx="0">
+            <a:schemeClr val="accent1"/>
+          </a:lnRef>
+          <a:fillRef idx="3">
+            <a:schemeClr val="accent1"/>
+          </a:fillRef>
+          <a:effectRef idx="3">
+            <a:schemeClr val="accent1"/>
+          </a:effectRef>
+          <a:fontRef idx="minor">
+            <a:schemeClr val="lt1"/>
+          </a:fontRef>
+        </p:style>
+        <p:txBody>
+          <a:bodyPr rtlCol="0" anchor="ctr"/>
+          <a:lstStyle/>
+          <a:p>
+            <a:pPr algn="ctr"/>
+            <a:r>
+              <a:rPr lang="en-US" dirty="0"/>
+              <a:t>Learn More</a:t>
+            </a:r>
+          </a:p>
+        </p:txBody>
+      </p:sp>
     </p:spTree>
     <p:extLst>
       <p:ext uri="{BB962C8B-B14F-4D97-AF65-F5344CB8AC3E}">

</xml_diff>